<commit_message>
much cleaner and simpler design
</commit_message>
<xml_diff>
--- a/triangle-simpler.pptx
+++ b/triangle-simpler.pptx
@@ -5,7 +5,7 @@
     <p:sldMasterId id="2147483684" r:id="rId1"/>
   </p:sldMasterIdLst>
   <p:sldIdLst>
-    <p:sldId id="261" r:id="rId2"/>
+    <p:sldId id="264" r:id="rId2"/>
   </p:sldIdLst>
   <p:sldSz cx="10972800" cy="10972800"/>
   <p:notesSz cx="7023100" cy="9309100"/>
@@ -243,7 +243,7 @@
           <a:p>
             <a:fld id="{6227D096-A259-4FCE-88BD-DC0E0BBC075A}" type="datetimeFigureOut">
               <a:rPr lang="en-US" smtClean="0"/>
-              <a:t>8/27/2024</a:t>
+              <a:t>8/28/2024</a:t>
             </a:fld>
             <a:endParaRPr lang="en-US"/>
           </a:p>
@@ -413,7 +413,7 @@
           <a:p>
             <a:fld id="{6227D096-A259-4FCE-88BD-DC0E0BBC075A}" type="datetimeFigureOut">
               <a:rPr lang="en-US" smtClean="0"/>
-              <a:t>8/27/2024</a:t>
+              <a:t>8/28/2024</a:t>
             </a:fld>
             <a:endParaRPr lang="en-US"/>
           </a:p>
@@ -593,7 +593,7 @@
           <a:p>
             <a:fld id="{6227D096-A259-4FCE-88BD-DC0E0BBC075A}" type="datetimeFigureOut">
               <a:rPr lang="en-US" smtClean="0"/>
-              <a:t>8/27/2024</a:t>
+              <a:t>8/28/2024</a:t>
             </a:fld>
             <a:endParaRPr lang="en-US"/>
           </a:p>
@@ -763,7 +763,7 @@
           <a:p>
             <a:fld id="{6227D096-A259-4FCE-88BD-DC0E0BBC075A}" type="datetimeFigureOut">
               <a:rPr lang="en-US" smtClean="0"/>
-              <a:t>8/27/2024</a:t>
+              <a:t>8/28/2024</a:t>
             </a:fld>
             <a:endParaRPr lang="en-US"/>
           </a:p>
@@ -1007,7 +1007,7 @@
           <a:p>
             <a:fld id="{6227D096-A259-4FCE-88BD-DC0E0BBC075A}" type="datetimeFigureOut">
               <a:rPr lang="en-US" smtClean="0"/>
-              <a:t>8/27/2024</a:t>
+              <a:t>8/28/2024</a:t>
             </a:fld>
             <a:endParaRPr lang="en-US"/>
           </a:p>
@@ -1239,7 +1239,7 @@
           <a:p>
             <a:fld id="{6227D096-A259-4FCE-88BD-DC0E0BBC075A}" type="datetimeFigureOut">
               <a:rPr lang="en-US" smtClean="0"/>
-              <a:t>8/27/2024</a:t>
+              <a:t>8/28/2024</a:t>
             </a:fld>
             <a:endParaRPr lang="en-US"/>
           </a:p>
@@ -1606,7 +1606,7 @@
           <a:p>
             <a:fld id="{6227D096-A259-4FCE-88BD-DC0E0BBC075A}" type="datetimeFigureOut">
               <a:rPr lang="en-US" smtClean="0"/>
-              <a:t>8/27/2024</a:t>
+              <a:t>8/28/2024</a:t>
             </a:fld>
             <a:endParaRPr lang="en-US"/>
           </a:p>
@@ -1724,7 +1724,7 @@
           <a:p>
             <a:fld id="{6227D096-A259-4FCE-88BD-DC0E0BBC075A}" type="datetimeFigureOut">
               <a:rPr lang="en-US" smtClean="0"/>
-              <a:t>8/27/2024</a:t>
+              <a:t>8/28/2024</a:t>
             </a:fld>
             <a:endParaRPr lang="en-US"/>
           </a:p>
@@ -1819,7 +1819,7 @@
           <a:p>
             <a:fld id="{6227D096-A259-4FCE-88BD-DC0E0BBC075A}" type="datetimeFigureOut">
               <a:rPr lang="en-US" smtClean="0"/>
-              <a:t>8/27/2024</a:t>
+              <a:t>8/28/2024</a:t>
             </a:fld>
             <a:endParaRPr lang="en-US"/>
           </a:p>
@@ -2096,7 +2096,7 @@
           <a:p>
             <a:fld id="{6227D096-A259-4FCE-88BD-DC0E0BBC075A}" type="datetimeFigureOut">
               <a:rPr lang="en-US" smtClean="0"/>
-              <a:t>8/27/2024</a:t>
+              <a:t>8/28/2024</a:t>
             </a:fld>
             <a:endParaRPr lang="en-US"/>
           </a:p>
@@ -2353,7 +2353,7 @@
           <a:p>
             <a:fld id="{6227D096-A259-4FCE-88BD-DC0E0BBC075A}" type="datetimeFigureOut">
               <a:rPr lang="en-US" smtClean="0"/>
-              <a:t>8/27/2024</a:t>
+              <a:t>8/28/2024</a:t>
             </a:fld>
             <a:endParaRPr lang="en-US"/>
           </a:p>
@@ -2566,7 +2566,7 @@
           <a:p>
             <a:fld id="{6227D096-A259-4FCE-88BD-DC0E0BBC075A}" type="datetimeFigureOut">
               <a:rPr lang="en-US" smtClean="0"/>
-              <a:t>8/27/2024</a:t>
+              <a:t>8/28/2024</a:t>
             </a:fld>
             <a:endParaRPr lang="en-US"/>
           </a:p>
@@ -2971,85 +2971,737 @@
           <a:chExt cx="0" cy="0"/>
         </a:xfrm>
       </p:grpSpPr>
-      <p:pic>
-        <p:nvPicPr>
-          <p:cNvPr id="3" name="Picture 2" descr="Shape&#10;&#10;Description automatically generated with low confidence">
+      <p:grpSp>
+        <p:nvGrpSpPr>
+          <p:cNvPr id="24" name="Group 23">
             <a:extLst>
               <a:ext uri="{FF2B5EF4-FFF2-40B4-BE49-F238E27FC236}">
-                <a16:creationId xmlns:a16="http://schemas.microsoft.com/office/drawing/2014/main" id="{BA322A11-A1DF-F756-790D-064C1809E2D7}"/>
+                <a16:creationId xmlns:a16="http://schemas.microsoft.com/office/drawing/2014/main" id="{D2886AA4-455C-370D-1F71-B04FAB866F0E}"/>
               </a:ext>
             </a:extLst>
           </p:cNvPr>
-          <p:cNvPicPr>
-            <a:picLocks noChangeAspect="1"/>
-          </p:cNvPicPr>
+          <p:cNvGrpSpPr/>
           <p:nvPr/>
-        </p:nvPicPr>
-        <p:blipFill rotWithShape="1">
-          <a:blip r:embed="rId2">
+        </p:nvGrpSpPr>
+        <p:grpSpPr>
+          <a:xfrm>
+            <a:off x="556130" y="240277"/>
+            <a:ext cx="9860540" cy="9860540"/>
+            <a:chOff x="556130" y="240277"/>
+            <a:chExt cx="9860540" cy="9860540"/>
+          </a:xfrm>
+        </p:grpSpPr>
+        <p:pic>
+          <p:nvPicPr>
+            <p:cNvPr id="5" name="Picture 4" descr="Shape&#10;&#10;Description automatically generated with low confidence">
+              <a:extLst>
+                <a:ext uri="{FF2B5EF4-FFF2-40B4-BE49-F238E27FC236}">
+                  <a16:creationId xmlns:a16="http://schemas.microsoft.com/office/drawing/2014/main" id="{CFBF0D7E-4F11-1592-912C-C43A67F189EA}"/>
+                </a:ext>
+              </a:extLst>
+            </p:cNvPr>
+            <p:cNvPicPr>
+              <a:picLocks noChangeAspect="1"/>
+            </p:cNvPicPr>
+            <p:nvPr/>
+          </p:nvPicPr>
+          <p:blipFill>
+            <a:blip r:embed="rId2">
+              <a:extLst>
+                <a:ext uri="{28A0092B-C50C-407E-A947-70E740481C1C}">
+                  <a14:useLocalDpi xmlns:a14="http://schemas.microsoft.com/office/drawing/2010/main" val="0"/>
+                </a:ext>
+              </a:extLst>
+            </a:blip>
+            <a:stretch>
+              <a:fillRect/>
+            </a:stretch>
+          </p:blipFill>
+          <p:spPr>
+            <a:xfrm rot="10800000">
+              <a:off x="556130" y="240277"/>
+              <a:ext cx="9860540" cy="9860540"/>
+            </a:xfrm>
+            <a:prstGeom prst="rect">
+              <a:avLst/>
+            </a:prstGeom>
+          </p:spPr>
+        </p:pic>
+        <mc:AlternateContent xmlns:mc="http://schemas.openxmlformats.org/markup-compatibility/2006">
+          <mc:Choice xmlns:a14="http://schemas.microsoft.com/office/drawing/2010/main" Requires="a14">
+            <p:sp>
+              <p:nvSpPr>
+                <p:cNvPr id="6" name="Rectangle: Rounded Corners 5">
+                  <a:extLst>
+                    <a:ext uri="{FF2B5EF4-FFF2-40B4-BE49-F238E27FC236}">
+                      <a16:creationId xmlns:a16="http://schemas.microsoft.com/office/drawing/2014/main" id="{CF149349-2557-04F4-A27C-26E3C95267E7}"/>
+                    </a:ext>
+                  </a:extLst>
+                </p:cNvPr>
+                <p:cNvSpPr/>
+                <p:nvPr/>
+              </p:nvSpPr>
+              <p:spPr>
+                <a:xfrm>
+                  <a:off x="6833488" y="2918913"/>
+                  <a:ext cx="914400" cy="914400"/>
+                </a:xfrm>
+                <a:prstGeom prst="roundRect">
+                  <a:avLst/>
+                </a:prstGeom>
+                <a:solidFill>
+                  <a:srgbClr val="FF0000"/>
+                </a:solidFill>
+              </p:spPr>
+              <p:style>
+                <a:lnRef idx="2">
+                  <a:schemeClr val="accent1">
+                    <a:shade val="15000"/>
+                  </a:schemeClr>
+                </a:lnRef>
+                <a:fillRef idx="1">
+                  <a:schemeClr val="accent1"/>
+                </a:fillRef>
+                <a:effectRef idx="0">
+                  <a:schemeClr val="accent1"/>
+                </a:effectRef>
+                <a:fontRef idx="minor">
+                  <a:schemeClr val="lt1"/>
+                </a:fontRef>
+              </p:style>
+              <p:txBody>
+                <a:bodyPr rtlCol="0" anchor="ctr"/>
+                <a:lstStyle/>
+                <a:p>
+                  <a:pPr algn="ctr"/>
+                  <a14:m>
+                    <m:oMathPara xmlns:m="http://schemas.openxmlformats.org/officeDocument/2006/math">
+                      <m:oMathParaPr>
+                        <m:jc m:val="centerGroup"/>
+                      </m:oMathParaPr>
+                      <m:oMath xmlns:m="http://schemas.openxmlformats.org/officeDocument/2006/math">
+                        <m:r>
+                          <m:rPr>
+                            <m:sty m:val="p"/>
+                          </m:rPr>
+                          <a:rPr lang="en-US" sz="4400" i="1">
+                            <a:solidFill>
+                              <a:schemeClr val="tx1"/>
+                            </a:solidFill>
+                            <a:latin typeface="Cambria Math" panose="02040503050406030204" pitchFamily="18" charset="0"/>
+                          </a:rPr>
+                          <m:t>e</m:t>
+                        </m:r>
+                      </m:oMath>
+                    </m:oMathPara>
+                  </a14:m>
+                  <a:endParaRPr lang="en-US" sz="4400" dirty="0">
+                    <a:solidFill>
+                      <a:schemeClr val="tx1"/>
+                    </a:solidFill>
+                  </a:endParaRPr>
+                </a:p>
+              </p:txBody>
+            </p:sp>
+          </mc:Choice>
+          <mc:Fallback>
+            <p:sp>
+              <p:nvSpPr>
+                <p:cNvPr id="6" name="Rectangle: Rounded Corners 5">
+                  <a:extLst>
+                    <a:ext uri="{FF2B5EF4-FFF2-40B4-BE49-F238E27FC236}">
+                      <a16:creationId xmlns:a16="http://schemas.microsoft.com/office/drawing/2014/main" id="{CF149349-2557-04F4-A27C-26E3C95267E7}"/>
+                    </a:ext>
+                  </a:extLst>
+                </p:cNvPr>
+                <p:cNvSpPr>
+                  <a:spLocks noRot="1" noChangeAspect="1" noMove="1" noResize="1" noEditPoints="1" noAdjustHandles="1" noChangeArrowheads="1" noChangeShapeType="1" noTextEdit="1"/>
+                </p:cNvSpPr>
+                <p:nvPr/>
+              </p:nvSpPr>
+              <p:spPr>
+                <a:xfrm>
+                  <a:off x="6833488" y="2918913"/>
+                  <a:ext cx="914400" cy="914400"/>
+                </a:xfrm>
+                <a:prstGeom prst="roundRect">
+                  <a:avLst/>
+                </a:prstGeom>
+                <a:blipFill>
+                  <a:blip r:embed="rId3"/>
+                  <a:stretch>
+                    <a:fillRect/>
+                  </a:stretch>
+                </a:blipFill>
+              </p:spPr>
+              <p:txBody>
+                <a:bodyPr/>
+                <a:lstStyle/>
+                <a:p>
+                  <a:r>
+                    <a:rPr lang="en-US">
+                      <a:noFill/>
+                    </a:rPr>
+                    <a:t> </a:t>
+                  </a:r>
+                </a:p>
+              </p:txBody>
+            </p:sp>
+          </mc:Fallback>
+        </mc:AlternateContent>
+        <mc:AlternateContent xmlns:mc="http://schemas.openxmlformats.org/markup-compatibility/2006">
+          <mc:Choice xmlns:a14="http://schemas.microsoft.com/office/drawing/2010/main" Requires="a14">
+            <p:sp>
+              <p:nvSpPr>
+                <p:cNvPr id="7" name="Rectangle: Rounded Corners 6">
+                  <a:extLst>
+                    <a:ext uri="{FF2B5EF4-FFF2-40B4-BE49-F238E27FC236}">
+                      <a16:creationId xmlns:a16="http://schemas.microsoft.com/office/drawing/2014/main" id="{6284B76B-7498-151B-F278-C990C3F152DA}"/>
+                    </a:ext>
+                  </a:extLst>
+                </p:cNvPr>
+                <p:cNvSpPr/>
+                <p:nvPr/>
+              </p:nvSpPr>
+              <p:spPr>
+                <a:xfrm>
+                  <a:off x="5029199" y="5983350"/>
+                  <a:ext cx="914400" cy="914400"/>
+                </a:xfrm>
+                <a:prstGeom prst="roundRect">
+                  <a:avLst/>
+                </a:prstGeom>
+                <a:solidFill>
+                  <a:srgbClr val="0000FF"/>
+                </a:solidFill>
+              </p:spPr>
+              <p:style>
+                <a:lnRef idx="2">
+                  <a:schemeClr val="accent1">
+                    <a:shade val="15000"/>
+                  </a:schemeClr>
+                </a:lnRef>
+                <a:fillRef idx="1">
+                  <a:schemeClr val="accent1"/>
+                </a:fillRef>
+                <a:effectRef idx="0">
+                  <a:schemeClr val="accent1"/>
+                </a:effectRef>
+                <a:fontRef idx="minor">
+                  <a:schemeClr val="lt1"/>
+                </a:fontRef>
+              </p:style>
+              <p:txBody>
+                <a:bodyPr rtlCol="0" anchor="ctr"/>
+                <a:lstStyle/>
+                <a:p>
+                  <a:pPr algn="ctr"/>
+                  <a14:m>
+                    <m:oMathPara xmlns:m="http://schemas.openxmlformats.org/officeDocument/2006/math">
+                      <m:oMathParaPr>
+                        <m:jc m:val="center"/>
+                      </m:oMathParaPr>
+                      <m:oMath xmlns:m="http://schemas.openxmlformats.org/officeDocument/2006/math">
+                        <m:sSub>
+                          <m:sSubPr>
+                            <m:ctrlPr>
+                              <a:rPr lang="en-US" sz="4400" i="1" smtClean="0">
+                                <a:solidFill>
+                                  <a:schemeClr val="bg1"/>
+                                </a:solidFill>
+                                <a:latin typeface="Cambria Math" panose="02040503050406030204" pitchFamily="18" charset="0"/>
+                              </a:rPr>
+                            </m:ctrlPr>
+                          </m:sSubPr>
+                          <m:e>
+                            <m:r>
+                              <a:rPr lang="en-US" sz="4400" i="1">
+                                <a:solidFill>
+                                  <a:schemeClr val="bg1"/>
+                                </a:solidFill>
+                                <a:latin typeface="Cambria Math" panose="02040503050406030204" pitchFamily="18" charset="0"/>
+                              </a:rPr>
+                              <m:t>𝑘</m:t>
+                            </m:r>
+                          </m:e>
+                          <m:sub>
+                            <m:r>
+                              <a:rPr lang="en-US" sz="4400" i="1">
+                                <a:solidFill>
+                                  <a:schemeClr val="bg1"/>
+                                </a:solidFill>
+                                <a:latin typeface="Cambria Math" panose="02040503050406030204" pitchFamily="18" charset="0"/>
+                              </a:rPr>
+                              <m:t>𝐵</m:t>
+                            </m:r>
+                          </m:sub>
+                        </m:sSub>
+                      </m:oMath>
+                    </m:oMathPara>
+                  </a14:m>
+                  <a:endParaRPr lang="en-US" sz="4400" dirty="0">
+                    <a:solidFill>
+                      <a:schemeClr val="bg1"/>
+                    </a:solidFill>
+                  </a:endParaRPr>
+                </a:p>
+              </p:txBody>
+            </p:sp>
+          </mc:Choice>
+          <mc:Fallback>
+            <p:sp>
+              <p:nvSpPr>
+                <p:cNvPr id="7" name="Rectangle: Rounded Corners 6">
+                  <a:extLst>
+                    <a:ext uri="{FF2B5EF4-FFF2-40B4-BE49-F238E27FC236}">
+                      <a16:creationId xmlns:a16="http://schemas.microsoft.com/office/drawing/2014/main" id="{6284B76B-7498-151B-F278-C990C3F152DA}"/>
+                    </a:ext>
+                  </a:extLst>
+                </p:cNvPr>
+                <p:cNvSpPr>
+                  <a:spLocks noRot="1" noChangeAspect="1" noMove="1" noResize="1" noEditPoints="1" noAdjustHandles="1" noChangeArrowheads="1" noChangeShapeType="1" noTextEdit="1"/>
+                </p:cNvSpPr>
+                <p:nvPr/>
+              </p:nvSpPr>
+              <p:spPr>
+                <a:xfrm>
+                  <a:off x="5029199" y="5983350"/>
+                  <a:ext cx="914400" cy="914400"/>
+                </a:xfrm>
+                <a:prstGeom prst="roundRect">
+                  <a:avLst/>
+                </a:prstGeom>
+                <a:blipFill>
+                  <a:blip r:embed="rId4"/>
+                  <a:stretch>
+                    <a:fillRect/>
+                  </a:stretch>
+                </a:blipFill>
+              </p:spPr>
+              <p:txBody>
+                <a:bodyPr/>
+                <a:lstStyle/>
+                <a:p>
+                  <a:r>
+                    <a:rPr lang="en-US">
+                      <a:noFill/>
+                    </a:rPr>
+                    <a:t> </a:t>
+                  </a:r>
+                </a:p>
+              </p:txBody>
+            </p:sp>
+          </mc:Fallback>
+        </mc:AlternateContent>
+        <mc:AlternateContent xmlns:mc="http://schemas.openxmlformats.org/markup-compatibility/2006">
+          <mc:Choice xmlns:a14="http://schemas.microsoft.com/office/drawing/2010/main" Requires="a14">
+            <p:sp>
+              <p:nvSpPr>
+                <p:cNvPr id="8" name="Rectangle: Rounded Corners 7">
+                  <a:extLst>
+                    <a:ext uri="{FF2B5EF4-FFF2-40B4-BE49-F238E27FC236}">
+                      <a16:creationId xmlns:a16="http://schemas.microsoft.com/office/drawing/2014/main" id="{80DE8D0C-09AE-FE49-8885-8EF638B28815}"/>
+                    </a:ext>
+                  </a:extLst>
+                </p:cNvPr>
+                <p:cNvSpPr/>
+                <p:nvPr/>
+              </p:nvSpPr>
+              <p:spPr>
+                <a:xfrm>
+                  <a:off x="3307947" y="2918913"/>
+                  <a:ext cx="914400" cy="914400"/>
+                </a:xfrm>
+                <a:prstGeom prst="roundRect">
+                  <a:avLst/>
+                </a:prstGeom>
+                <a:solidFill>
+                  <a:srgbClr val="FFFF00"/>
+                </a:solidFill>
+              </p:spPr>
+              <p:style>
+                <a:lnRef idx="2">
+                  <a:schemeClr val="accent1">
+                    <a:shade val="15000"/>
+                  </a:schemeClr>
+                </a:lnRef>
+                <a:fillRef idx="1">
+                  <a:schemeClr val="accent1"/>
+                </a:fillRef>
+                <a:effectRef idx="0">
+                  <a:schemeClr val="accent1"/>
+                </a:effectRef>
+                <a:fontRef idx="minor">
+                  <a:schemeClr val="lt1"/>
+                </a:fontRef>
+              </p:style>
+              <p:txBody>
+                <a:bodyPr rtlCol="0" anchor="ctr"/>
+                <a:lstStyle/>
+                <a:p>
+                  <a:pPr algn="ctr"/>
+                  <a14:m>
+                    <m:oMathPara xmlns:m="http://schemas.openxmlformats.org/officeDocument/2006/math">
+                      <m:oMathParaPr>
+                        <m:jc m:val="centerGroup"/>
+                      </m:oMathParaPr>
+                      <m:oMath xmlns:m="http://schemas.openxmlformats.org/officeDocument/2006/math">
+                        <m:r>
+                          <a:rPr lang="en-US" sz="4400" i="1" smtClean="0">
+                            <a:solidFill>
+                              <a:schemeClr val="tx1"/>
+                            </a:solidFill>
+                            <a:latin typeface="Cambria Math" panose="02040503050406030204" pitchFamily="18" charset="0"/>
+                          </a:rPr>
+                          <m:t>h</m:t>
+                        </m:r>
+                      </m:oMath>
+                    </m:oMathPara>
+                  </a14:m>
+                  <a:endParaRPr lang="en-US" sz="4400" dirty="0">
+                    <a:solidFill>
+                      <a:schemeClr val="tx1"/>
+                    </a:solidFill>
+                  </a:endParaRPr>
+                </a:p>
+              </p:txBody>
+            </p:sp>
+          </mc:Choice>
+          <mc:Fallback>
+            <p:sp>
+              <p:nvSpPr>
+                <p:cNvPr id="8" name="Rectangle: Rounded Corners 7">
+                  <a:extLst>
+                    <a:ext uri="{FF2B5EF4-FFF2-40B4-BE49-F238E27FC236}">
+                      <a16:creationId xmlns:a16="http://schemas.microsoft.com/office/drawing/2014/main" id="{80DE8D0C-09AE-FE49-8885-8EF638B28815}"/>
+                    </a:ext>
+                  </a:extLst>
+                </p:cNvPr>
+                <p:cNvSpPr>
+                  <a:spLocks noRot="1" noChangeAspect="1" noMove="1" noResize="1" noEditPoints="1" noAdjustHandles="1" noChangeArrowheads="1" noChangeShapeType="1" noTextEdit="1"/>
+                </p:cNvSpPr>
+                <p:nvPr/>
+              </p:nvSpPr>
+              <p:spPr>
+                <a:xfrm>
+                  <a:off x="3307947" y="2918913"/>
+                  <a:ext cx="914400" cy="914400"/>
+                </a:xfrm>
+                <a:prstGeom prst="roundRect">
+                  <a:avLst/>
+                </a:prstGeom>
+                <a:blipFill>
+                  <a:blip r:embed="rId5"/>
+                  <a:stretch>
+                    <a:fillRect/>
+                  </a:stretch>
+                </a:blipFill>
+              </p:spPr>
+              <p:txBody>
+                <a:bodyPr/>
+                <a:lstStyle/>
+                <a:p>
+                  <a:r>
+                    <a:rPr lang="en-US">
+                      <a:noFill/>
+                    </a:rPr>
+                    <a:t> </a:t>
+                  </a:r>
+                </a:p>
+              </p:txBody>
+            </p:sp>
+          </mc:Fallback>
+        </mc:AlternateContent>
+        <p:sp>
+          <p:nvSpPr>
+            <p:cNvPr id="9" name="Rectangle: Rounded Corners 8">
+              <a:extLst>
+                <a:ext uri="{FF2B5EF4-FFF2-40B4-BE49-F238E27FC236}">
+                  <a16:creationId xmlns:a16="http://schemas.microsoft.com/office/drawing/2014/main" id="{5E5DBC23-35D8-DF0F-2F3F-32D7990506E8}"/>
+                </a:ext>
+              </a:extLst>
+            </p:cNvPr>
+            <p:cNvSpPr/>
+            <p:nvPr/>
+          </p:nvSpPr>
+          <p:spPr>
+            <a:xfrm>
+              <a:off x="8940280" y="1760111"/>
+              <a:ext cx="914400" cy="914400"/>
+            </a:xfrm>
+            <a:prstGeom prst="roundRect">
+              <a:avLst/>
+            </a:prstGeom>
+            <a:solidFill>
+              <a:srgbClr val="FF8C00"/>
+            </a:solidFill>
+          </p:spPr>
+          <p:style>
+            <a:lnRef idx="2">
+              <a:schemeClr val="accent1">
+                <a:shade val="15000"/>
+              </a:schemeClr>
+            </a:lnRef>
+            <a:fillRef idx="1">
+              <a:schemeClr val="accent1"/>
+            </a:fillRef>
+            <a:effectRef idx="0">
+              <a:schemeClr val="accent1"/>
+            </a:effectRef>
+            <a:fontRef idx="minor">
+              <a:schemeClr val="lt1"/>
+            </a:fontRef>
+          </p:style>
+          <p:txBody>
+            <a:bodyPr rtlCol="0" anchor="ctr"/>
+            <a:lstStyle/>
+            <a:p>
+              <a:pPr algn="ctr"/>
+              <a:r>
+                <a:rPr lang="en-US" sz="4400" dirty="0">
+                  <a:solidFill>
+                    <a:schemeClr val="tx1"/>
+                  </a:solidFill>
+                </a:rPr>
+                <a:t>V</a:t>
+              </a:r>
+            </a:p>
+          </p:txBody>
+        </p:sp>
+        <p:sp>
+          <p:nvSpPr>
+            <p:cNvPr id="10" name="Rectangle: Rounded Corners 9">
+              <a:extLst>
+                <a:ext uri="{FF2B5EF4-FFF2-40B4-BE49-F238E27FC236}">
+                  <a16:creationId xmlns:a16="http://schemas.microsoft.com/office/drawing/2014/main" id="{C03CDC52-C56D-EB74-98ED-4D263A1CFEF7}"/>
+                </a:ext>
+              </a:extLst>
+            </p:cNvPr>
+            <p:cNvSpPr/>
+            <p:nvPr/>
+          </p:nvSpPr>
+          <p:spPr>
+            <a:xfrm>
+              <a:off x="5029199" y="8493324"/>
+              <a:ext cx="914400" cy="914400"/>
+            </a:xfrm>
+            <a:prstGeom prst="roundRect">
+              <a:avLst/>
+            </a:prstGeom>
+            <a:solidFill>
+              <a:srgbClr val="00B050"/>
+            </a:solidFill>
+          </p:spPr>
+          <p:style>
+            <a:lnRef idx="2">
+              <a:schemeClr val="accent1">
+                <a:shade val="15000"/>
+              </a:schemeClr>
+            </a:lnRef>
+            <a:fillRef idx="1">
+              <a:schemeClr val="accent1"/>
+            </a:fillRef>
+            <a:effectRef idx="0">
+              <a:schemeClr val="accent1"/>
+            </a:effectRef>
+            <a:fontRef idx="minor">
+              <a:schemeClr val="lt1"/>
+            </a:fontRef>
+          </p:style>
+          <p:txBody>
+            <a:bodyPr rtlCol="0" anchor="ctr"/>
+            <a:lstStyle/>
+            <a:p>
+              <a:pPr algn="ctr"/>
+              <a:r>
+                <a:rPr lang="en-US" sz="4400" dirty="0">
+                  <a:solidFill>
+                    <a:schemeClr val="tx1"/>
+                  </a:solidFill>
+                </a:rPr>
+                <a:t>T</a:t>
+              </a:r>
+            </a:p>
+          </p:txBody>
+        </p:sp>
+        <p:sp>
+          <p:nvSpPr>
+            <p:cNvPr id="11" name="Rectangle: Rounded Corners 10">
+              <a:extLst>
+                <a:ext uri="{FF2B5EF4-FFF2-40B4-BE49-F238E27FC236}">
+                  <a16:creationId xmlns:a16="http://schemas.microsoft.com/office/drawing/2014/main" id="{08403D81-A604-111E-8DFC-A682D9F31260}"/>
+                </a:ext>
+              </a:extLst>
+            </p:cNvPr>
+            <p:cNvSpPr/>
+            <p:nvPr/>
+          </p:nvSpPr>
+          <p:spPr>
+            <a:xfrm>
+              <a:off x="1053493" y="1760111"/>
+              <a:ext cx="914400" cy="914400"/>
+            </a:xfrm>
+            <a:prstGeom prst="roundRect">
+              <a:avLst/>
+            </a:prstGeom>
+            <a:solidFill>
+              <a:srgbClr val="FF00FF"/>
+            </a:solidFill>
+          </p:spPr>
+          <p:style>
+            <a:lnRef idx="2">
+              <a:schemeClr val="accent1">
+                <a:shade val="15000"/>
+              </a:schemeClr>
+            </a:lnRef>
+            <a:fillRef idx="1">
+              <a:schemeClr val="accent1"/>
+            </a:fillRef>
+            <a:effectRef idx="0">
+              <a:schemeClr val="accent1"/>
+            </a:effectRef>
+            <a:fontRef idx="minor">
+              <a:schemeClr val="lt1"/>
+            </a:fontRef>
+          </p:style>
+          <p:txBody>
+            <a:bodyPr rtlCol="0" anchor="ctr"/>
+            <a:lstStyle/>
+            <a:p>
+              <a:pPr algn="ctr"/>
+              <a:r>
+                <a:rPr lang="en-US" sz="4400" dirty="0">
+                  <a:solidFill>
+                    <a:schemeClr val="tx1"/>
+                  </a:solidFill>
+                </a:rPr>
+                <a:t>f</a:t>
+              </a:r>
+            </a:p>
+          </p:txBody>
+        </p:sp>
+        <p:sp>
+          <p:nvSpPr>
+            <p:cNvPr id="12" name="Rectangle: Rounded Corners 11">
+              <a:extLst>
+                <a:ext uri="{FF2B5EF4-FFF2-40B4-BE49-F238E27FC236}">
+                  <a16:creationId xmlns:a16="http://schemas.microsoft.com/office/drawing/2014/main" id="{92B65B22-858C-BC97-E141-73BE86C95001}"/>
+                </a:ext>
+              </a:extLst>
+            </p:cNvPr>
+            <p:cNvSpPr/>
+            <p:nvPr/>
+          </p:nvSpPr>
+          <p:spPr>
+            <a:xfrm>
+              <a:off x="5073318" y="3965748"/>
+              <a:ext cx="914400" cy="914400"/>
+            </a:xfrm>
+            <a:prstGeom prst="roundRect">
+              <a:avLst/>
+            </a:prstGeom>
+            <a:solidFill>
+              <a:schemeClr val="accent3"/>
+            </a:solidFill>
+          </p:spPr>
+          <p:style>
+            <a:lnRef idx="2">
+              <a:schemeClr val="accent1">
+                <a:shade val="15000"/>
+              </a:schemeClr>
+            </a:lnRef>
+            <a:fillRef idx="1">
+              <a:schemeClr val="accent1"/>
+            </a:fillRef>
+            <a:effectRef idx="0">
+              <a:schemeClr val="accent1"/>
+            </a:effectRef>
+            <a:fontRef idx="minor">
+              <a:schemeClr val="lt1"/>
+            </a:fontRef>
+          </p:style>
+          <p:txBody>
+            <a:bodyPr rtlCol="0" anchor="ctr"/>
+            <a:lstStyle/>
+            <a:p>
+              <a:pPr algn="ctr"/>
+              <a:r>
+                <a:rPr lang="en-US" sz="3200" dirty="0">
+                  <a:solidFill>
+                    <a:schemeClr val="tx1"/>
+                  </a:solidFill>
+                </a:rPr>
+                <a:t>P</a:t>
+              </a:r>
+            </a:p>
+          </p:txBody>
+        </p:sp>
+      </p:grpSp>
+      <p:sp>
+        <p:nvSpPr>
+          <p:cNvPr id="3" name="TextBox 2">
             <a:extLst>
-              <a:ext uri="{28A0092B-C50C-407E-A947-70E740481C1C}">
-                <a14:useLocalDpi xmlns:a14="http://schemas.microsoft.com/office/drawing/2010/main" val="0"/>
+              <a:ext uri="{FF2B5EF4-FFF2-40B4-BE49-F238E27FC236}">
+                <a16:creationId xmlns:a16="http://schemas.microsoft.com/office/drawing/2014/main" id="{55C2C606-FAC1-68DB-BA76-EE27D952F9B9}"/>
               </a:ext>
             </a:extLst>
-          </a:blip>
-          <a:srcRect b="12339"/>
-          <a:stretch/>
-        </p:blipFill>
+          </p:cNvPr>
+          <p:cNvSpPr txBox="1"/>
+          <p:nvPr/>
+        </p:nvSpPr>
         <p:spPr>
           <a:xfrm>
-            <a:off x="718693" y="1012248"/>
-            <a:ext cx="9684818" cy="8489797"/>
+            <a:off x="88159" y="237356"/>
+            <a:ext cx="10670394" cy="769441"/>
           </a:xfrm>
           <a:prstGeom prst="rect">
             <a:avLst/>
           </a:prstGeom>
+          <a:noFill/>
         </p:spPr>
-      </p:pic>
+        <p:txBody>
+          <a:bodyPr wrap="square" rtlCol="0">
+            <a:spAutoFit/>
+          </a:bodyPr>
+          <a:lstStyle/>
+          <a:p>
+            <a:pPr algn="ctr"/>
+            <a:r>
+              <a:rPr lang="en-US" sz="4400" dirty="0"/>
+              <a:t>QUANTUM THERMAL METROLOGY TRIANGLE</a:t>
+            </a:r>
+            <a:endParaRPr lang="en-US" dirty="0"/>
+          </a:p>
+        </p:txBody>
+      </p:sp>
       <mc:AlternateContent xmlns:mc="http://schemas.openxmlformats.org/markup-compatibility/2006">
         <mc:Choice xmlns:a14="http://schemas.microsoft.com/office/drawing/2010/main" Requires="a14">
           <p:sp>
             <p:nvSpPr>
-              <p:cNvPr id="18" name="Rectangle: Rounded Corners 17">
+              <p:cNvPr id="19" name="TextBox 18">
                 <a:extLst>
                   <a:ext uri="{FF2B5EF4-FFF2-40B4-BE49-F238E27FC236}">
-                    <a16:creationId xmlns:a16="http://schemas.microsoft.com/office/drawing/2014/main" id="{1C6C4520-4A5D-FB86-2AD0-56D50CCE4EDF}"/>
+                    <a16:creationId xmlns:a16="http://schemas.microsoft.com/office/drawing/2014/main" id="{4C56640F-C02F-3A89-42DC-C0C346AB7DC4}"/>
                   </a:ext>
                 </a:extLst>
               </p:cNvPr>
-              <p:cNvSpPr/>
+              <p:cNvSpPr txBox="1"/>
               <p:nvPr/>
             </p:nvSpPr>
             <p:spPr>
               <a:xfrm>
-                <a:off x="284318" y="8204419"/>
-                <a:ext cx="2514600" cy="1371600"/>
+                <a:off x="7265288" y="9824995"/>
+                <a:ext cx="3735453" cy="970202"/>
               </a:xfrm>
-              <a:prstGeom prst="roundRect">
+              <a:prstGeom prst="rect">
                 <a:avLst/>
               </a:prstGeom>
-              <a:solidFill>
-                <a:srgbClr val="FF0000"/>
-              </a:solidFill>
+              <a:noFill/>
             </p:spPr>
-            <p:style>
-              <a:lnRef idx="2">
-                <a:schemeClr val="accent1">
-                  <a:shade val="15000"/>
-                </a:schemeClr>
-              </a:lnRef>
-              <a:fillRef idx="1">
-                <a:schemeClr val="accent1"/>
-              </a:fillRef>
-              <a:effectRef idx="0">
-                <a:schemeClr val="accent1"/>
-              </a:effectRef>
-              <a:fontRef idx="minor">
-                <a:schemeClr val="lt1"/>
-              </a:fontRef>
-            </p:style>
             <p:txBody>
-              <a:bodyPr rtlCol="0" anchor="ctr"/>
+              <a:bodyPr wrap="square">
+                <a:spAutoFit/>
+              </a:bodyPr>
               <a:lstStyle/>
               <a:p>
                 <a:pPr algn="ctr"/>
@@ -3063,7 +3715,7 @@
                         <m:rPr>
                           <m:sty m:val="p"/>
                         </m:rPr>
-                        <a:rPr lang="en-US" sz="2000" i="1">
+                        <a:rPr lang="en-US" sz="3000" i="1" smtClean="0">
                           <a:solidFill>
                             <a:schemeClr val="tx1"/>
                           </a:solidFill>
@@ -3072,7 +3724,7 @@
                         <m:t>e</m:t>
                       </m:r>
                       <m:r>
-                        <a:rPr lang="en-US" sz="2000" i="1">
+                        <a:rPr lang="en-US" sz="3000" i="1" smtClean="0">
                           <a:solidFill>
                             <a:schemeClr val="tx1"/>
                           </a:solidFill>
@@ -3083,7 +3735,7 @@
                       <m:f>
                         <m:fPr>
                           <m:ctrlPr>
-                            <a:rPr lang="en-US" sz="2000" i="1">
+                            <a:rPr lang="en-US" sz="3000" i="1">
                               <a:solidFill>
                                 <a:schemeClr val="tx1"/>
                               </a:solidFill>
@@ -3093,45 +3745,27 @@
                         </m:fPr>
                         <m:num>
                           <m:r>
-                            <a:rPr lang="en-US" sz="2000" i="1">
+                            <a:rPr lang="en-US" sz="3000" i="1">
                               <a:solidFill>
                                 <a:schemeClr val="tx1"/>
                               </a:solidFill>
                               <a:latin typeface="Cambria Math" panose="02040503050406030204" pitchFamily="18" charset="0"/>
                             </a:rPr>
-                            <m:t>𝑓</m:t>
+                            <m:t>𝑓𝑊</m:t>
                           </m:r>
+                        </m:num>
+                        <m:den>
                           <m:r>
-                            <a:rPr lang="en-US" sz="2000" i="1">
+                            <a:rPr lang="en-US" sz="3000" i="1">
                               <a:solidFill>
                                 <a:schemeClr val="tx1"/>
                               </a:solidFill>
                               <a:latin typeface="Cambria Math" panose="02040503050406030204" pitchFamily="18" charset="0"/>
                             </a:rPr>
-                            <m:t>𝑊</m:t>
-                          </m:r>
-                        </m:num>
-                        <m:den>
-                          <m:r>
-                            <a:rPr lang="en-US" sz="2000" i="1">
-                              <a:solidFill>
-                                <a:schemeClr val="tx1"/>
-                              </a:solidFill>
-                              <a:latin typeface="Cambria Math" panose="02040503050406030204" pitchFamily="18" charset="0"/>
-                            </a:rPr>
-                            <m:t>𝑚</m:t>
+                            <m:t>𝑚𝑉</m:t>
                           </m:r>
                           <m:r>
-                            <a:rPr lang="en-US" sz="2000" i="1">
-                              <a:solidFill>
-                                <a:schemeClr val="tx1"/>
-                              </a:solidFill>
-                              <a:latin typeface="Cambria Math" panose="02040503050406030204" pitchFamily="18" charset="0"/>
-                            </a:rPr>
-                            <m:t>𝑉</m:t>
-                          </m:r>
-                          <m:r>
-                            <a:rPr lang="en-US" sz="2000" i="1">
+                            <a:rPr lang="en-US" sz="3000" i="1">
                               <a:solidFill>
                                 <a:schemeClr val="tx1"/>
                               </a:solidFill>
@@ -3141,7 +3775,7 @@
                             <m:t>∙</m:t>
                           </m:r>
                           <m:r>
-                            <a:rPr lang="en-US" sz="2000" i="1">
+                            <a:rPr lang="en-US" sz="3000" i="1">
                               <a:solidFill>
                                 <a:schemeClr val="tx1"/>
                               </a:solidFill>
@@ -3154,7 +3788,7 @@
                     </m:oMath>
                   </m:oMathPara>
                 </a14:m>
-                <a:endParaRPr lang="en-US" sz="2000" dirty="0">
+                <a:endParaRPr lang="en-US" sz="3000" dirty="0">
                   <a:solidFill>
                     <a:schemeClr val="tx1"/>
                   </a:solidFill>
@@ -3166,28 +3800,28 @@
         <mc:Fallback>
           <p:sp>
             <p:nvSpPr>
-              <p:cNvPr id="18" name="Rectangle: Rounded Corners 17">
+              <p:cNvPr id="19" name="TextBox 18">
                 <a:extLst>
                   <a:ext uri="{FF2B5EF4-FFF2-40B4-BE49-F238E27FC236}">
-                    <a16:creationId xmlns:a16="http://schemas.microsoft.com/office/drawing/2014/main" id="{1C6C4520-4A5D-FB86-2AD0-56D50CCE4EDF}"/>
+                    <a16:creationId xmlns:a16="http://schemas.microsoft.com/office/drawing/2014/main" id="{4C56640F-C02F-3A89-42DC-C0C346AB7DC4}"/>
                   </a:ext>
                 </a:extLst>
               </p:cNvPr>
-              <p:cNvSpPr>
+              <p:cNvSpPr txBox="1">
                 <a:spLocks noRot="1" noChangeAspect="1" noMove="1" noResize="1" noEditPoints="1" noAdjustHandles="1" noChangeArrowheads="1" noChangeShapeType="1" noTextEdit="1"/>
               </p:cNvSpPr>
               <p:nvPr/>
             </p:nvSpPr>
             <p:spPr>
               <a:xfrm>
-                <a:off x="284318" y="8204419"/>
-                <a:ext cx="2514600" cy="1371600"/>
+                <a:off x="7265288" y="9824995"/>
+                <a:ext cx="3735453" cy="970202"/>
               </a:xfrm>
-              <a:prstGeom prst="roundRect">
+              <a:prstGeom prst="rect">
                 <a:avLst/>
               </a:prstGeom>
               <a:blipFill>
-                <a:blip r:embed="rId3"/>
+                <a:blip r:embed="rId6"/>
                 <a:stretch>
                   <a:fillRect/>
                 </a:stretch>
@@ -3212,46 +3846,30 @@
         <mc:Choice xmlns:a14="http://schemas.microsoft.com/office/drawing/2010/main" Requires="a14">
           <p:sp>
             <p:nvSpPr>
-              <p:cNvPr id="21" name="Rectangle: Rounded Corners 20">
+              <p:cNvPr id="21" name="TextBox 20">
                 <a:extLst>
                   <a:ext uri="{FF2B5EF4-FFF2-40B4-BE49-F238E27FC236}">
-                    <a16:creationId xmlns:a16="http://schemas.microsoft.com/office/drawing/2014/main" id="{DDFAA716-2272-285C-CAC1-E4E20EB611BB}"/>
+                    <a16:creationId xmlns:a16="http://schemas.microsoft.com/office/drawing/2014/main" id="{E5B756AF-D749-FA5C-B0B1-D6482BF77106}"/>
                   </a:ext>
                 </a:extLst>
               </p:cNvPr>
-              <p:cNvSpPr/>
+              <p:cNvSpPr txBox="1"/>
               <p:nvPr/>
             </p:nvSpPr>
             <p:spPr>
               <a:xfrm>
-                <a:off x="8255807" y="8204419"/>
-                <a:ext cx="2514600" cy="1371600"/>
+                <a:off x="-13441" y="9888684"/>
+                <a:ext cx="2942401" cy="970202"/>
               </a:xfrm>
-              <a:prstGeom prst="roundRect">
+              <a:prstGeom prst="rect">
                 <a:avLst/>
               </a:prstGeom>
-              <a:solidFill>
-                <a:srgbClr val="0000FF"/>
-              </a:solidFill>
+              <a:noFill/>
             </p:spPr>
-            <p:style>
-              <a:lnRef idx="2">
-                <a:schemeClr val="accent1">
-                  <a:shade val="15000"/>
-                </a:schemeClr>
-              </a:lnRef>
-              <a:fillRef idx="1">
-                <a:schemeClr val="accent1"/>
-              </a:fillRef>
-              <a:effectRef idx="0">
-                <a:schemeClr val="accent1"/>
-              </a:effectRef>
-              <a:fontRef idx="minor">
-                <a:schemeClr val="lt1"/>
-              </a:fontRef>
-            </p:style>
             <p:txBody>
-              <a:bodyPr rtlCol="0" anchor="ctr"/>
+              <a:bodyPr wrap="square">
+                <a:spAutoFit/>
+              </a:bodyPr>
               <a:lstStyle/>
               <a:p>
                 <a:pPr algn="ctr"/>
@@ -3261,73 +3879,30 @@
                       <m:jc m:val="centerGroup"/>
                     </m:oMathParaPr>
                     <m:oMath xmlns:m="http://schemas.openxmlformats.org/officeDocument/2006/math">
-                      <m:sSub>
-                        <m:sSubPr>
-                          <m:ctrlPr>
-                            <a:rPr lang="en-US" sz="2000" i="1" smtClean="0">
-                              <a:solidFill>
-                                <a:schemeClr val="bg1"/>
-                              </a:solidFill>
-                              <a:latin typeface="Cambria Math" panose="02040503050406030204" pitchFamily="18" charset="0"/>
-                            </a:rPr>
-                          </m:ctrlPr>
-                        </m:sSubPr>
-                        <m:e>
-                          <m:r>
-                            <a:rPr lang="en-US" sz="2000" i="1">
-                              <a:solidFill>
-                                <a:schemeClr val="bg1"/>
-                              </a:solidFill>
-                              <a:latin typeface="Cambria Math" panose="02040503050406030204" pitchFamily="18" charset="0"/>
-                            </a:rPr>
-                            <m:t>𝑘</m:t>
-                          </m:r>
-                        </m:e>
-                        <m:sub>
-                          <m:r>
-                            <a:rPr lang="en-US" sz="2000" i="1">
-                              <a:solidFill>
-                                <a:schemeClr val="bg1"/>
-                              </a:solidFill>
-                              <a:latin typeface="Cambria Math" panose="02040503050406030204" pitchFamily="18" charset="0"/>
-                            </a:rPr>
-                            <m:t>𝐵</m:t>
-                          </m:r>
-                        </m:sub>
-                      </m:sSub>
                       <m:r>
-                        <a:rPr lang="en-US" sz="2000" i="1">
+                        <a:rPr lang="en-US" sz="3000" i="1" smtClean="0">
                           <a:solidFill>
-                            <a:schemeClr val="bg1"/>
+                            <a:schemeClr val="tx1"/>
                           </a:solidFill>
                           <a:latin typeface="Cambria Math" panose="02040503050406030204" pitchFamily="18" charset="0"/>
                         </a:rPr>
-                        <m:t>=</m:t>
+                        <m:t>h</m:t>
                       </m:r>
                       <m:r>
-                        <a:rPr lang="en-US" sz="2000" i="1">
+                        <a:rPr lang="en-US" sz="3000" i="1" smtClean="0">
                           <a:solidFill>
-                            <a:schemeClr val="bg1"/>
+                            <a:schemeClr val="tx1"/>
                           </a:solidFill>
                           <a:latin typeface="Cambria Math" panose="02040503050406030204" pitchFamily="18" charset="0"/>
                         </a:rPr>
-                        <m:t>0.0</m:t>
-                      </m:r>
-                      <m:r>
-                        <a:rPr lang="en-US" sz="2000" i="1">
-                          <a:solidFill>
-                            <a:schemeClr val="bg1"/>
-                          </a:solidFill>
-                          <a:latin typeface="Cambria Math" panose="02040503050406030204" pitchFamily="18" charset="0"/>
-                        </a:rPr>
-                        <m:t>1</m:t>
+                        <m:t>=0.7</m:t>
                       </m:r>
                       <m:f>
                         <m:fPr>
                           <m:ctrlPr>
-                            <a:rPr lang="en-US" sz="2000" i="1">
+                            <a:rPr lang="en-US" sz="3000" i="1">
                               <a:solidFill>
-                                <a:schemeClr val="bg1"/>
+                                <a:schemeClr val="tx1"/>
                               </a:solidFill>
                               <a:latin typeface="Cambria Math" panose="02040503050406030204" pitchFamily="18" charset="0"/>
                             </a:rPr>
@@ -3335,9 +3910,9 @@
                         </m:fPr>
                         <m:num>
                           <m:r>
-                            <a:rPr lang="en-US" sz="2000" i="1">
+                            <a:rPr lang="en-US" sz="3000" i="1">
                               <a:solidFill>
-                                <a:schemeClr val="bg1"/>
+                                <a:schemeClr val="tx1"/>
                               </a:solidFill>
                               <a:latin typeface="Cambria Math" panose="02040503050406030204" pitchFamily="18" charset="0"/>
                             </a:rPr>
@@ -3345,53 +3920,48 @@
                           </m:r>
                         </m:num>
                         <m:den>
-                          <m:r>
-                            <a:rPr lang="en-US" sz="2000" i="1">
-                              <a:solidFill>
-                                <a:schemeClr val="bg1"/>
-                              </a:solidFill>
-                              <a:latin typeface="Cambria Math" panose="02040503050406030204" pitchFamily="18" charset="0"/>
-                            </a:rPr>
-                            <m:t>𝐺𝐻𝑧</m:t>
-                          </m:r>
-                          <m:r>
-                            <a:rPr lang="en-US" sz="2000" i="1">
-                              <a:solidFill>
-                                <a:schemeClr val="bg1"/>
-                              </a:solidFill>
-                              <a:latin typeface="Cambria Math" panose="02040503050406030204" pitchFamily="18" charset="0"/>
-                              <a:ea typeface="Cambria Math" panose="02040503050406030204" pitchFamily="18" charset="0"/>
-                            </a:rPr>
-                            <m:t>∙</m:t>
-                          </m:r>
-                          <m:r>
-                            <a:rPr lang="en-US" sz="2000" i="1">
-                              <a:solidFill>
-                                <a:schemeClr val="bg1"/>
-                              </a:solidFill>
-                              <a:latin typeface="Cambria Math" panose="02040503050406030204" pitchFamily="18" charset="0"/>
-                              <a:ea typeface="Cambria Math" panose="02040503050406030204" pitchFamily="18" charset="0"/>
-                            </a:rPr>
-                            <m:t>𝑚</m:t>
-                          </m:r>
-                          <m:r>
-                            <a:rPr lang="en-US" sz="2000" i="1">
-                              <a:solidFill>
-                                <a:schemeClr val="bg1"/>
-                              </a:solidFill>
-                              <a:latin typeface="Cambria Math" panose="02040503050406030204" pitchFamily="18" charset="0"/>
-                              <a:ea typeface="Cambria Math" panose="02040503050406030204" pitchFamily="18" charset="0"/>
-                            </a:rPr>
-                            <m:t>𝐾</m:t>
-                          </m:r>
+                          <m:sSup>
+                            <m:sSupPr>
+                              <m:ctrlPr>
+                                <a:rPr lang="en-US" sz="3000" i="1">
+                                  <a:solidFill>
+                                    <a:schemeClr val="tx1"/>
+                                  </a:solidFill>
+                                  <a:latin typeface="Cambria Math" panose="02040503050406030204" pitchFamily="18" charset="0"/>
+                                </a:rPr>
+                              </m:ctrlPr>
+                            </m:sSupPr>
+                            <m:e>
+                              <m:r>
+                                <a:rPr lang="en-US" sz="3000" i="1">
+                                  <a:solidFill>
+                                    <a:schemeClr val="tx1"/>
+                                  </a:solidFill>
+                                  <a:latin typeface="Cambria Math" panose="02040503050406030204" pitchFamily="18" charset="0"/>
+                                </a:rPr>
+                                <m:t>𝐺𝐻𝑧</m:t>
+                              </m:r>
+                            </m:e>
+                            <m:sup>
+                              <m:r>
+                                <a:rPr lang="en-US" sz="3000" i="1">
+                                  <a:solidFill>
+                                    <a:schemeClr val="tx1"/>
+                                  </a:solidFill>
+                                  <a:latin typeface="Cambria Math" panose="02040503050406030204" pitchFamily="18" charset="0"/>
+                                </a:rPr>
+                                <m:t>2</m:t>
+                              </m:r>
+                            </m:sup>
+                          </m:sSup>
                         </m:den>
                       </m:f>
                     </m:oMath>
                   </m:oMathPara>
                 </a14:m>
-                <a:endParaRPr lang="en-US" sz="2000" dirty="0">
+                <a:endParaRPr lang="en-US" sz="3000" dirty="0">
                   <a:solidFill>
-                    <a:schemeClr val="bg1"/>
+                    <a:schemeClr val="tx1"/>
                   </a:solidFill>
                 </a:endParaRPr>
               </a:p>
@@ -3401,28 +3971,28 @@
         <mc:Fallback>
           <p:sp>
             <p:nvSpPr>
-              <p:cNvPr id="21" name="Rectangle: Rounded Corners 20">
+              <p:cNvPr id="21" name="TextBox 20">
                 <a:extLst>
                   <a:ext uri="{FF2B5EF4-FFF2-40B4-BE49-F238E27FC236}">
-                    <a16:creationId xmlns:a16="http://schemas.microsoft.com/office/drawing/2014/main" id="{DDFAA716-2272-285C-CAC1-E4E20EB611BB}"/>
+                    <a16:creationId xmlns:a16="http://schemas.microsoft.com/office/drawing/2014/main" id="{E5B756AF-D749-FA5C-B0B1-D6482BF77106}"/>
                   </a:ext>
                 </a:extLst>
               </p:cNvPr>
-              <p:cNvSpPr>
+              <p:cNvSpPr txBox="1">
                 <a:spLocks noRot="1" noChangeAspect="1" noMove="1" noResize="1" noEditPoints="1" noAdjustHandles="1" noChangeArrowheads="1" noChangeShapeType="1" noTextEdit="1"/>
               </p:cNvSpPr>
               <p:nvPr/>
             </p:nvSpPr>
             <p:spPr>
               <a:xfrm>
-                <a:off x="8255807" y="8204419"/>
-                <a:ext cx="2514600" cy="1371600"/>
+                <a:off x="-13441" y="9888684"/>
+                <a:ext cx="2942401" cy="970202"/>
               </a:xfrm>
-              <a:prstGeom prst="roundRect">
+              <a:prstGeom prst="rect">
                 <a:avLst/>
               </a:prstGeom>
               <a:blipFill>
-                <a:blip r:embed="rId4"/>
+                <a:blip r:embed="rId7"/>
                 <a:stretch>
                   <a:fillRect/>
                 </a:stretch>
@@ -3447,46 +4017,30 @@
         <mc:Choice xmlns:a14="http://schemas.microsoft.com/office/drawing/2010/main" Requires="a14">
           <p:sp>
             <p:nvSpPr>
-              <p:cNvPr id="4" name="Rectangle: Rounded Corners 3">
+              <p:cNvPr id="23" name="TextBox 22">
                 <a:extLst>
                   <a:ext uri="{FF2B5EF4-FFF2-40B4-BE49-F238E27FC236}">
-                    <a16:creationId xmlns:a16="http://schemas.microsoft.com/office/drawing/2014/main" id="{F32D8B7C-4CF0-BA78-5353-41A46AD10499}"/>
+                    <a16:creationId xmlns:a16="http://schemas.microsoft.com/office/drawing/2014/main" id="{A7BAE5A5-38AC-CE56-74F1-E96C310F5D36}"/>
                   </a:ext>
                 </a:extLst>
               </p:cNvPr>
-              <p:cNvSpPr/>
+              <p:cNvSpPr txBox="1"/>
               <p:nvPr/>
             </p:nvSpPr>
             <p:spPr>
               <a:xfrm>
-                <a:off x="4243388" y="1085541"/>
-                <a:ext cx="2514600" cy="1371600"/>
+                <a:off x="2572235" y="9893123"/>
+                <a:ext cx="5150253" cy="970202"/>
               </a:xfrm>
-              <a:prstGeom prst="roundRect">
+              <a:prstGeom prst="rect">
                 <a:avLst/>
               </a:prstGeom>
-              <a:solidFill>
-                <a:srgbClr val="FFFF00"/>
-              </a:solidFill>
+              <a:noFill/>
             </p:spPr>
-            <p:style>
-              <a:lnRef idx="2">
-                <a:schemeClr val="accent1">
-                  <a:shade val="15000"/>
-                </a:schemeClr>
-              </a:lnRef>
-              <a:fillRef idx="1">
-                <a:schemeClr val="accent1"/>
-              </a:fillRef>
-              <a:effectRef idx="0">
-                <a:schemeClr val="accent1"/>
-              </a:effectRef>
-              <a:fontRef idx="minor">
-                <a:schemeClr val="lt1"/>
-              </a:fontRef>
-            </p:style>
             <p:txBody>
-              <a:bodyPr rtlCol="0" anchor="ctr"/>
+              <a:bodyPr wrap="square">
+                <a:spAutoFit/>
+              </a:bodyPr>
               <a:lstStyle/>
               <a:p>
                 <a:pPr algn="ctr"/>
@@ -3496,28 +4050,53 @@
                       <m:jc m:val="centerGroup"/>
                     </m:oMathParaPr>
                     <m:oMath xmlns:m="http://schemas.openxmlformats.org/officeDocument/2006/math">
+                      <m:sSub>
+                        <m:sSubPr>
+                          <m:ctrlPr>
+                            <a:rPr lang="en-US" sz="3000" i="1" smtClean="0">
+                              <a:solidFill>
+                                <a:schemeClr val="tx1"/>
+                              </a:solidFill>
+                              <a:latin typeface="Cambria Math" panose="02040503050406030204" pitchFamily="18" charset="0"/>
+                            </a:rPr>
+                          </m:ctrlPr>
+                        </m:sSubPr>
+                        <m:e>
+                          <m:r>
+                            <a:rPr lang="en-US" sz="3000" i="1">
+                              <a:solidFill>
+                                <a:schemeClr val="tx1"/>
+                              </a:solidFill>
+                              <a:latin typeface="Cambria Math" panose="02040503050406030204" pitchFamily="18" charset="0"/>
+                            </a:rPr>
+                            <m:t>𝑘</m:t>
+                          </m:r>
+                        </m:e>
+                        <m:sub>
+                          <m:r>
+                            <a:rPr lang="en-US" sz="3000" i="1">
+                              <a:solidFill>
+                                <a:schemeClr val="tx1"/>
+                              </a:solidFill>
+                              <a:latin typeface="Cambria Math" panose="02040503050406030204" pitchFamily="18" charset="0"/>
+                            </a:rPr>
+                            <m:t>𝐵</m:t>
+                          </m:r>
+                        </m:sub>
+                      </m:sSub>
                       <m:r>
-                        <a:rPr lang="en-US" sz="2000" i="1">
+                        <a:rPr lang="en-US" sz="3000" i="1">
                           <a:solidFill>
                             <a:schemeClr val="tx1"/>
                           </a:solidFill>
                           <a:latin typeface="Cambria Math" panose="02040503050406030204" pitchFamily="18" charset="0"/>
                         </a:rPr>
-                        <m:t>h</m:t>
-                      </m:r>
-                      <m:r>
-                        <a:rPr lang="en-US" sz="2000" i="1">
-                          <a:solidFill>
-                            <a:schemeClr val="tx1"/>
-                          </a:solidFill>
-                          <a:latin typeface="Cambria Math" panose="02040503050406030204" pitchFamily="18" charset="0"/>
-                        </a:rPr>
-                        <m:t>=0.7</m:t>
+                        <m:t>=0.01</m:t>
                       </m:r>
                       <m:f>
                         <m:fPr>
                           <m:ctrlPr>
-                            <a:rPr lang="en-US" sz="2000" i="1">
+                            <a:rPr lang="en-US" sz="3000" i="1">
                               <a:solidFill>
                                 <a:schemeClr val="tx1"/>
                               </a:solidFill>
@@ -3527,65 +4106,51 @@
                         </m:fPr>
                         <m:num>
                           <m:r>
-                            <a:rPr lang="en-US" sz="2000" i="1">
+                            <a:rPr lang="en-US" sz="3000" i="1">
                               <a:solidFill>
                                 <a:schemeClr val="tx1"/>
                               </a:solidFill>
                               <a:latin typeface="Cambria Math" panose="02040503050406030204" pitchFamily="18" charset="0"/>
                             </a:rPr>
-                            <m:t>𝑓</m:t>
+                            <m:t>𝑓𝑊</m:t>
                           </m:r>
+                        </m:num>
+                        <m:den>
                           <m:r>
-                            <a:rPr lang="en-US" sz="2000" i="1">
+                            <a:rPr lang="en-US" sz="3000" i="1">
                               <a:solidFill>
                                 <a:schemeClr val="tx1"/>
                               </a:solidFill>
                               <a:latin typeface="Cambria Math" panose="02040503050406030204" pitchFamily="18" charset="0"/>
                             </a:rPr>
-                            <m:t>𝑊</m:t>
+                            <m:t>𝐺𝐻𝑧</m:t>
                           </m:r>
-                        </m:num>
-                        <m:den>
-                          <m:sSup>
-                            <m:sSupPr>
-                              <m:ctrlPr>
-                                <a:rPr lang="en-US" sz="2000" i="1">
-                                  <a:solidFill>
-                                    <a:schemeClr val="tx1"/>
-                                  </a:solidFill>
-                                  <a:latin typeface="Cambria Math" panose="02040503050406030204" pitchFamily="18" charset="0"/>
-                                </a:rPr>
-                              </m:ctrlPr>
-                            </m:sSupPr>
-                            <m:e>
-                              <m:r>
-                                <a:rPr lang="en-US" sz="2000" i="1">
-                                  <a:solidFill>
-                                    <a:schemeClr val="tx1"/>
-                                  </a:solidFill>
-                                  <a:latin typeface="Cambria Math" panose="02040503050406030204" pitchFamily="18" charset="0"/>
-                                </a:rPr>
-                                <m:t>𝐺𝐻𝑧</m:t>
-                              </m:r>
-                            </m:e>
-                            <m:sup>
-                              <m:r>
-                                <a:rPr lang="en-US" sz="2000" i="1">
-                                  <a:solidFill>
-                                    <a:schemeClr val="tx1"/>
-                                  </a:solidFill>
-                                  <a:latin typeface="Cambria Math" panose="02040503050406030204" pitchFamily="18" charset="0"/>
-                                </a:rPr>
-                                <m:t>2</m:t>
-                              </m:r>
-                            </m:sup>
-                          </m:sSup>
+                          <m:r>
+                            <a:rPr lang="en-US" sz="3000" i="1">
+                              <a:solidFill>
+                                <a:schemeClr val="tx1"/>
+                              </a:solidFill>
+                              <a:latin typeface="Cambria Math" panose="02040503050406030204" pitchFamily="18" charset="0"/>
+                              <a:ea typeface="Cambria Math" panose="02040503050406030204" pitchFamily="18" charset="0"/>
+                            </a:rPr>
+                            <m:t>∙</m:t>
+                          </m:r>
+                          <m:r>
+                            <a:rPr lang="en-US" sz="3000" i="1">
+                              <a:solidFill>
+                                <a:schemeClr val="tx1"/>
+                              </a:solidFill>
+                              <a:latin typeface="Cambria Math" panose="02040503050406030204" pitchFamily="18" charset="0"/>
+                              <a:ea typeface="Cambria Math" panose="02040503050406030204" pitchFamily="18" charset="0"/>
+                            </a:rPr>
+                            <m:t>𝑚𝐾</m:t>
+                          </m:r>
                         </m:den>
                       </m:f>
                     </m:oMath>
                   </m:oMathPara>
                 </a14:m>
-                <a:endParaRPr lang="en-US" sz="2000" dirty="0">
+                <a:endParaRPr lang="en-US" sz="3000" dirty="0">
                   <a:solidFill>
                     <a:schemeClr val="tx1"/>
                   </a:solidFill>
@@ -3597,28 +4162,28 @@
         <mc:Fallback>
           <p:sp>
             <p:nvSpPr>
-              <p:cNvPr id="4" name="Rectangle: Rounded Corners 3">
+              <p:cNvPr id="23" name="TextBox 22">
                 <a:extLst>
                   <a:ext uri="{FF2B5EF4-FFF2-40B4-BE49-F238E27FC236}">
-                    <a16:creationId xmlns:a16="http://schemas.microsoft.com/office/drawing/2014/main" id="{F32D8B7C-4CF0-BA78-5353-41A46AD10499}"/>
+                    <a16:creationId xmlns:a16="http://schemas.microsoft.com/office/drawing/2014/main" id="{A7BAE5A5-38AC-CE56-74F1-E96C310F5D36}"/>
                   </a:ext>
                 </a:extLst>
               </p:cNvPr>
-              <p:cNvSpPr>
+              <p:cNvSpPr txBox="1">
                 <a:spLocks noRot="1" noChangeAspect="1" noMove="1" noResize="1" noEditPoints="1" noAdjustHandles="1" noChangeArrowheads="1" noChangeShapeType="1" noTextEdit="1"/>
               </p:cNvSpPr>
               <p:nvPr/>
             </p:nvSpPr>
             <p:spPr>
               <a:xfrm>
-                <a:off x="4243388" y="1085541"/>
-                <a:ext cx="2514600" cy="1371600"/>
+                <a:off x="2572235" y="9893123"/>
+                <a:ext cx="5150253" cy="970202"/>
               </a:xfrm>
-              <a:prstGeom prst="roundRect">
+              <a:prstGeom prst="rect">
                 <a:avLst/>
               </a:prstGeom>
               <a:blipFill>
-                <a:blip r:embed="rId5"/>
+                <a:blip r:embed="rId8"/>
                 <a:stretch>
                   <a:fillRect/>
                 </a:stretch>
@@ -3639,315 +4204,10 @@
           </p:sp>
         </mc:Fallback>
       </mc:AlternateContent>
-      <p:sp>
-        <p:nvSpPr>
-          <p:cNvPr id="5" name="Rectangle: Rounded Corners 4">
-            <a:extLst>
-              <a:ext uri="{FF2B5EF4-FFF2-40B4-BE49-F238E27FC236}">
-                <a16:creationId xmlns:a16="http://schemas.microsoft.com/office/drawing/2014/main" id="{8F563A04-3320-E2C8-6600-264C073FE29F}"/>
-              </a:ext>
-            </a:extLst>
-          </p:cNvPr>
-          <p:cNvSpPr/>
-          <p:nvPr/>
-        </p:nvSpPr>
-        <p:spPr>
-          <a:xfrm>
-            <a:off x="8255807" y="3236734"/>
-            <a:ext cx="2514600" cy="1371600"/>
-          </a:xfrm>
-          <a:prstGeom prst="roundRect">
-            <a:avLst/>
-          </a:prstGeom>
-          <a:solidFill>
-            <a:srgbClr val="FF8C00"/>
-          </a:solidFill>
-        </p:spPr>
-        <p:style>
-          <a:lnRef idx="2">
-            <a:schemeClr val="accent1">
-              <a:shade val="15000"/>
-            </a:schemeClr>
-          </a:lnRef>
-          <a:fillRef idx="1">
-            <a:schemeClr val="accent1"/>
-          </a:fillRef>
-          <a:effectRef idx="0">
-            <a:schemeClr val="accent1"/>
-          </a:effectRef>
-          <a:fontRef idx="minor">
-            <a:schemeClr val="lt1"/>
-          </a:fontRef>
-        </p:style>
-        <p:txBody>
-          <a:bodyPr rtlCol="0" anchor="ctr"/>
-          <a:lstStyle/>
-          <a:p>
-            <a:pPr algn="ctr"/>
-            <a:r>
-              <a:rPr lang="en-US" sz="3200" dirty="0">
-                <a:solidFill>
-                  <a:schemeClr val="tx1"/>
-                </a:solidFill>
-              </a:rPr>
-              <a:t>Voltage</a:t>
-            </a:r>
-          </a:p>
-          <a:p>
-            <a:pPr algn="ctr"/>
-            <a:r>
-              <a:rPr lang="en-US" sz="3200" dirty="0">
-                <a:solidFill>
-                  <a:schemeClr val="tx1"/>
-                </a:solidFill>
-              </a:rPr>
-              <a:t>mV</a:t>
-            </a:r>
-          </a:p>
-        </p:txBody>
-      </p:sp>
-      <p:sp>
-        <p:nvSpPr>
-          <p:cNvPr id="6" name="Rectangle: Rounded Corners 5">
-            <a:extLst>
-              <a:ext uri="{FF2B5EF4-FFF2-40B4-BE49-F238E27FC236}">
-                <a16:creationId xmlns:a16="http://schemas.microsoft.com/office/drawing/2014/main" id="{24883B1E-0345-EAA6-49A4-3CF9FC893FE4}"/>
-              </a:ext>
-            </a:extLst>
-          </p:cNvPr>
-          <p:cNvSpPr/>
-          <p:nvPr/>
-        </p:nvSpPr>
-        <p:spPr>
-          <a:xfrm>
-            <a:off x="284318" y="3236734"/>
-            <a:ext cx="2514600" cy="1371600"/>
-          </a:xfrm>
-          <a:prstGeom prst="roundRect">
-            <a:avLst/>
-          </a:prstGeom>
-          <a:solidFill>
-            <a:srgbClr val="00B050"/>
-          </a:solidFill>
-        </p:spPr>
-        <p:style>
-          <a:lnRef idx="2">
-            <a:schemeClr val="accent1">
-              <a:shade val="15000"/>
-            </a:schemeClr>
-          </a:lnRef>
-          <a:fillRef idx="1">
-            <a:schemeClr val="accent1"/>
-          </a:fillRef>
-          <a:effectRef idx="0">
-            <a:schemeClr val="accent1"/>
-          </a:effectRef>
-          <a:fontRef idx="minor">
-            <a:schemeClr val="lt1"/>
-          </a:fontRef>
-        </p:style>
-        <p:txBody>
-          <a:bodyPr rtlCol="0" anchor="ctr"/>
-          <a:lstStyle/>
-          <a:p>
-            <a:pPr algn="ctr"/>
-            <a:r>
-              <a:rPr lang="en-US" sz="3200" dirty="0">
-                <a:solidFill>
-                  <a:schemeClr val="tx1"/>
-                </a:solidFill>
-              </a:rPr>
-              <a:t>Temperature</a:t>
-            </a:r>
-          </a:p>
-          <a:p>
-            <a:pPr algn="ctr"/>
-            <a:r>
-              <a:rPr lang="en-US" sz="3200" dirty="0">
-                <a:solidFill>
-                  <a:schemeClr val="tx1"/>
-                </a:solidFill>
-              </a:rPr>
-              <a:t>mK</a:t>
-            </a:r>
-          </a:p>
-        </p:txBody>
-      </p:sp>
-      <p:sp>
-        <p:nvSpPr>
-          <p:cNvPr id="7" name="Rectangle: Rounded Corners 6">
-            <a:extLst>
-              <a:ext uri="{FF2B5EF4-FFF2-40B4-BE49-F238E27FC236}">
-                <a16:creationId xmlns:a16="http://schemas.microsoft.com/office/drawing/2014/main" id="{C0DF33BA-7887-700C-0C4F-6DA92C04DAA6}"/>
-              </a:ext>
-            </a:extLst>
-          </p:cNvPr>
-          <p:cNvSpPr/>
-          <p:nvPr/>
-        </p:nvSpPr>
-        <p:spPr>
-          <a:xfrm>
-            <a:off x="4229100" y="9502044"/>
-            <a:ext cx="2514600" cy="1371600"/>
-          </a:xfrm>
-          <a:prstGeom prst="roundRect">
-            <a:avLst/>
-          </a:prstGeom>
-          <a:solidFill>
-            <a:srgbClr val="FF00FF"/>
-          </a:solidFill>
-        </p:spPr>
-        <p:style>
-          <a:lnRef idx="2">
-            <a:schemeClr val="accent1">
-              <a:shade val="15000"/>
-            </a:schemeClr>
-          </a:lnRef>
-          <a:fillRef idx="1">
-            <a:schemeClr val="accent1"/>
-          </a:fillRef>
-          <a:effectRef idx="0">
-            <a:schemeClr val="accent1"/>
-          </a:effectRef>
-          <a:fontRef idx="minor">
-            <a:schemeClr val="lt1"/>
-          </a:fontRef>
-        </p:style>
-        <p:txBody>
-          <a:bodyPr rtlCol="0" anchor="ctr"/>
-          <a:lstStyle/>
-          <a:p>
-            <a:pPr algn="ctr"/>
-            <a:r>
-              <a:rPr lang="en-US" sz="3200" dirty="0">
-                <a:solidFill>
-                  <a:schemeClr val="tx1"/>
-                </a:solidFill>
-              </a:rPr>
-              <a:t>Frequency</a:t>
-            </a:r>
-          </a:p>
-          <a:p>
-            <a:pPr algn="ctr"/>
-            <a:r>
-              <a:rPr lang="en-US" sz="3200" dirty="0">
-                <a:solidFill>
-                  <a:schemeClr val="tx1"/>
-                </a:solidFill>
-              </a:rPr>
-              <a:t>GHz</a:t>
-            </a:r>
-          </a:p>
-        </p:txBody>
-      </p:sp>
-      <p:sp>
-        <p:nvSpPr>
-          <p:cNvPr id="15" name="Rectangle: Rounded Corners 14">
-            <a:extLst>
-              <a:ext uri="{FF2B5EF4-FFF2-40B4-BE49-F238E27FC236}">
-                <a16:creationId xmlns:a16="http://schemas.microsoft.com/office/drawing/2014/main" id="{AF2EEC75-0C5D-62BC-0D36-9D7FBB990127}"/>
-              </a:ext>
-            </a:extLst>
-          </p:cNvPr>
-          <p:cNvSpPr/>
-          <p:nvPr/>
-        </p:nvSpPr>
-        <p:spPr>
-          <a:xfrm>
-            <a:off x="4229100" y="5686289"/>
-            <a:ext cx="2514600" cy="1371600"/>
-          </a:xfrm>
-          <a:prstGeom prst="roundRect">
-            <a:avLst/>
-          </a:prstGeom>
-          <a:solidFill>
-            <a:schemeClr val="accent3"/>
-          </a:solidFill>
-        </p:spPr>
-        <p:style>
-          <a:lnRef idx="2">
-            <a:schemeClr val="accent1">
-              <a:shade val="15000"/>
-            </a:schemeClr>
-          </a:lnRef>
-          <a:fillRef idx="1">
-            <a:schemeClr val="accent1"/>
-          </a:fillRef>
-          <a:effectRef idx="0">
-            <a:schemeClr val="accent1"/>
-          </a:effectRef>
-          <a:fontRef idx="minor">
-            <a:schemeClr val="lt1"/>
-          </a:fontRef>
-        </p:style>
-        <p:txBody>
-          <a:bodyPr rtlCol="0" anchor="ctr"/>
-          <a:lstStyle/>
-          <a:p>
-            <a:pPr algn="ctr"/>
-            <a:r>
-              <a:rPr lang="en-US" sz="3200" dirty="0">
-                <a:solidFill>
-                  <a:schemeClr val="tx1"/>
-                </a:solidFill>
-              </a:rPr>
-              <a:t>Power</a:t>
-            </a:r>
-          </a:p>
-          <a:p>
-            <a:pPr algn="ctr"/>
-            <a:r>
-              <a:rPr lang="en-US" sz="3200" dirty="0">
-                <a:solidFill>
-                  <a:schemeClr val="tx1"/>
-                </a:solidFill>
-              </a:rPr>
-              <a:t>fW</a:t>
-            </a:r>
-          </a:p>
-        </p:txBody>
-      </p:sp>
-      <p:sp>
-        <p:nvSpPr>
-          <p:cNvPr id="16" name="TextBox 15">
-            <a:extLst>
-              <a:ext uri="{FF2B5EF4-FFF2-40B4-BE49-F238E27FC236}">
-                <a16:creationId xmlns:a16="http://schemas.microsoft.com/office/drawing/2014/main" id="{BFE456C1-16C0-0392-1E7D-F4A9F341E843}"/>
-              </a:ext>
-            </a:extLst>
-          </p:cNvPr>
-          <p:cNvSpPr txBox="1"/>
-          <p:nvPr/>
-        </p:nvSpPr>
-        <p:spPr>
-          <a:xfrm>
-            <a:off x="100013" y="226826"/>
-            <a:ext cx="10670394" cy="769441"/>
-          </a:xfrm>
-          <a:prstGeom prst="rect">
-            <a:avLst/>
-          </a:prstGeom>
-          <a:noFill/>
-        </p:spPr>
-        <p:txBody>
-          <a:bodyPr wrap="square" rtlCol="0">
-            <a:spAutoFit/>
-          </a:bodyPr>
-          <a:lstStyle/>
-          <a:p>
-            <a:pPr algn="ctr"/>
-            <a:r>
-              <a:rPr lang="en-US" sz="4400" dirty="0"/>
-              <a:t>QUANTUM THERMAL METROLOGY TRIANGLE</a:t>
-            </a:r>
-            <a:endParaRPr lang="en-US" dirty="0"/>
-          </a:p>
-        </p:txBody>
-      </p:sp>
     </p:spTree>
     <p:extLst>
       <p:ext uri="{BB962C8B-B14F-4D97-AF65-F5344CB8AC3E}">
-        <p14:creationId xmlns:p14="http://schemas.microsoft.com/office/powerpoint/2010/main" val="3956674770"/>
+        <p14:creationId xmlns:p14="http://schemas.microsoft.com/office/powerpoint/2010/main" val="540963081"/>
       </p:ext>
     </p:extLst>
   </p:cSld>

</xml_diff>

<commit_message>
small improvements of aligments
</commit_message>
<xml_diff>
--- a/triangle-simpler.pptx
+++ b/triangle-simpler.pptx
@@ -2973,10 +2973,10 @@
       </p:grpSpPr>
       <p:grpSp>
         <p:nvGrpSpPr>
-          <p:cNvPr id="24" name="Group 23">
+          <p:cNvPr id="2" name="Group 1">
             <a:extLst>
               <a:ext uri="{FF2B5EF4-FFF2-40B4-BE49-F238E27FC236}">
-                <a16:creationId xmlns:a16="http://schemas.microsoft.com/office/drawing/2014/main" id="{D2886AA4-455C-370D-1F71-B04FAB866F0E}"/>
+                <a16:creationId xmlns:a16="http://schemas.microsoft.com/office/drawing/2014/main" id="{FDF1E60D-2E0F-6EB6-916D-0EFD6BCCC031}"/>
               </a:ext>
             </a:extLst>
           </p:cNvPr>
@@ -2985,7 +2985,7 @@
         </p:nvGrpSpPr>
         <p:grpSpPr>
           <a:xfrm>
-            <a:off x="556130" y="240277"/>
+            <a:off x="556130" y="189477"/>
             <a:ext cx="9860540" cy="9860540"/>
             <a:chOff x="556130" y="240277"/>
             <a:chExt cx="9860540" cy="9860540"/>
@@ -3043,7 +3043,7 @@
               </p:nvSpPr>
               <p:spPr>
                 <a:xfrm>
-                  <a:off x="6833488" y="2918913"/>
+                  <a:off x="6761196" y="2918913"/>
                   <a:ext cx="914400" cy="914400"/>
                 </a:xfrm>
                 <a:prstGeom prst="roundRect">
@@ -3121,7 +3121,7 @@
               </p:nvSpPr>
               <p:spPr>
                 <a:xfrm>
-                  <a:off x="6833488" y="2918913"/>
+                  <a:off x="6761196" y="2918913"/>
                   <a:ext cx="914400" cy="914400"/>
                 </a:xfrm>
                 <a:prstGeom prst="roundRect">
@@ -3165,7 +3165,7 @@
               </p:nvSpPr>
               <p:spPr>
                 <a:xfrm>
-                  <a:off x="5029199" y="5983350"/>
+                  <a:off x="5026426" y="5983987"/>
                   <a:ext cx="914400" cy="914400"/>
                 </a:xfrm>
                 <a:prstGeom prst="roundRect">
@@ -3265,7 +3265,7 @@
               </p:nvSpPr>
               <p:spPr>
                 <a:xfrm>
-                  <a:off x="5029199" y="5983350"/>
+                  <a:off x="5026426" y="5983987"/>
                   <a:ext cx="914400" cy="914400"/>
                 </a:xfrm>
                 <a:prstGeom prst="roundRect">
@@ -3426,7 +3426,7 @@
           </p:nvSpPr>
           <p:spPr>
             <a:xfrm>
-              <a:off x="8940280" y="1760111"/>
+              <a:off x="8963725" y="1689773"/>
               <a:ext cx="914400" cy="914400"/>
             </a:xfrm>
             <a:prstGeom prst="roundRect">
@@ -3538,7 +3538,7 @@
           </p:nvSpPr>
           <p:spPr>
             <a:xfrm>
-              <a:off x="1053493" y="1760111"/>
+              <a:off x="1082620" y="1689773"/>
               <a:ext cx="914400" cy="914400"/>
             </a:xfrm>
             <a:prstGeom prst="roundRect">
@@ -3594,7 +3594,7 @@
           </p:nvSpPr>
           <p:spPr>
             <a:xfrm>
-              <a:off x="5073318" y="3965748"/>
+              <a:off x="5026426" y="3965748"/>
               <a:ext cx="914400" cy="914400"/>
             </a:xfrm>
             <a:prstGeom prst="roundRect">
@@ -3674,8 +3674,8 @@
           </a:p>
         </p:txBody>
       </p:sp>
-      <mc:AlternateContent xmlns:mc="http://schemas.openxmlformats.org/markup-compatibility/2006">
-        <mc:Choice xmlns:a14="http://schemas.microsoft.com/office/drawing/2010/main" Requires="a14">
+      <mc:AlternateContent xmlns:mc="http://schemas.openxmlformats.org/markup-compatibility/2006" xmlns:a14="http://schemas.microsoft.com/office/drawing/2010/main">
+        <mc:Choice Requires="a14">
           <p:sp>
             <p:nvSpPr>
               <p:cNvPr id="19" name="TextBox 18">
@@ -3797,7 +3797,7 @@
             </p:txBody>
           </p:sp>
         </mc:Choice>
-        <mc:Fallback>
+        <mc:Fallback xmlns="">
           <p:sp>
             <p:nvSpPr>
               <p:cNvPr id="19" name="TextBox 18">
@@ -3842,8 +3842,8 @@
           </p:sp>
         </mc:Fallback>
       </mc:AlternateContent>
-      <mc:AlternateContent xmlns:mc="http://schemas.openxmlformats.org/markup-compatibility/2006">
-        <mc:Choice xmlns:a14="http://schemas.microsoft.com/office/drawing/2010/main" Requires="a14">
+      <mc:AlternateContent xmlns:mc="http://schemas.openxmlformats.org/markup-compatibility/2006" xmlns:a14="http://schemas.microsoft.com/office/drawing/2010/main">
+        <mc:Choice Requires="a14">
           <p:sp>
             <p:nvSpPr>
               <p:cNvPr id="21" name="TextBox 20">
@@ -3968,7 +3968,7 @@
             </p:txBody>
           </p:sp>
         </mc:Choice>
-        <mc:Fallback>
+        <mc:Fallback xmlns="">
           <p:sp>
             <p:nvSpPr>
               <p:cNvPr id="21" name="TextBox 20">
@@ -4013,8 +4013,8 @@
           </p:sp>
         </mc:Fallback>
       </mc:AlternateContent>
-      <mc:AlternateContent xmlns:mc="http://schemas.openxmlformats.org/markup-compatibility/2006">
-        <mc:Choice xmlns:a14="http://schemas.microsoft.com/office/drawing/2010/main" Requires="a14">
+      <mc:AlternateContent xmlns:mc="http://schemas.openxmlformats.org/markup-compatibility/2006" xmlns:a14="http://schemas.microsoft.com/office/drawing/2010/main">
+        <mc:Choice Requires="a14">
           <p:sp>
             <p:nvSpPr>
               <p:cNvPr id="23" name="TextBox 22">
@@ -4159,7 +4159,7 @@
             </p:txBody>
           </p:sp>
         </mc:Choice>
-        <mc:Fallback>
+        <mc:Fallback xmlns="">
           <p:sp>
             <p:nvSpPr>
               <p:cNvPr id="23" name="TextBox 22">

</xml_diff>